<commit_message>
frontend api 예시 생성 및 redux 적용중..
</commit_message>
<xml_diff>
--- a/Web_Project_개발가이드.pptx
+++ b/Web_Project_개발가이드.pptx
@@ -120,7 +120,7 @@
   </p:defaultTextStyle>
   <p:extLst>
     <p:ext uri="{EFAFB233-063F-42B5-8137-9DF3F51BA10A}">
-      <p15:sldGuideLst xmlns="" xmlns:p15="http://schemas.microsoft.com/office/powerpoint/2012/main">
+      <p15:sldGuideLst xmlns:p15="http://schemas.microsoft.com/office/powerpoint/2012/main" xmlns="">
         <p15:guide id="1" orient="horz" pos="2160">
           <p15:clr>
             <a:srgbClr val="A4A3A4"/>
@@ -134,7 +134,7 @@
       </p15:sldGuideLst>
     </p:ext>
     <p:ext uri="{2D200454-40CA-4A62-9FC3-DE9A4176ACB9}">
-      <p15:notesGuideLst xmlns="" xmlns:p15="http://schemas.microsoft.com/office/powerpoint/2012/main">
+      <p15:notesGuideLst xmlns:p15="http://schemas.microsoft.com/office/powerpoint/2012/main" xmlns="">
         <p15:guide id="1" orient="horz" pos="2880">
           <p15:clr>
             <a:srgbClr val="A4A3A4"/>
@@ -233,7 +233,7 @@
           <a:p>
             <a:fld id="{11A87D86-70CF-4EFA-807B-0FE5BC66CB49}" type="datetimeFigureOut">
               <a:rPr lang="ko-KR" altLang="en-US" smtClean="0"/>
-              <a:t>2020-08-12</a:t>
+              <a:t>2020-08-16</a:t>
             </a:fld>
             <a:endParaRPr lang="ko-KR" altLang="en-US" dirty="0"/>
           </a:p>
@@ -917,7 +917,7 @@
           <a:p>
             <a:fld id="{FC8640AA-852D-4CCA-BFB8-6C6DDFB4B0C6}" type="datetime1">
               <a:rPr lang="ko-KR" altLang="en-US" smtClean="0"/>
-              <a:t>2020-08-12</a:t>
+              <a:t>2020-08-16</a:t>
             </a:fld>
             <a:endParaRPr lang="ko-KR" altLang="en-US" dirty="0"/>
           </a:p>
@@ -1044,7 +1044,7 @@
             <a:fld id="{D2998125-7EAC-4794-A754-927A8BE1AB53}" type="datetime1">
               <a:rPr lang="ko-KR" altLang="en-US" smtClean="0"/>
               <a:pPr/>
-              <a:t>2020-08-12</a:t>
+              <a:t>2020-08-16</a:t>
             </a:fld>
             <a:endParaRPr lang="ko-KR" altLang="en-US" dirty="0"/>
           </a:p>
@@ -1484,7 +1484,7 @@
             <a:fld id="{D2998125-7EAC-4794-A754-927A8BE1AB53}" type="datetime1">
               <a:rPr lang="ko-KR" altLang="en-US" smtClean="0"/>
               <a:pPr/>
-              <a:t>2020-08-12</a:t>
+              <a:t>2020-08-16</a:t>
             </a:fld>
             <a:endParaRPr lang="ko-KR" altLang="en-US" dirty="0"/>
           </a:p>
@@ -2056,7 +2056,7 @@
           <a:p>
             <a:fld id="{2EA4FFEB-8A33-4D80-BB66-E025D1AC5FE4}" type="datetime1">
               <a:rPr lang="ko-KR" altLang="en-US" smtClean="0"/>
-              <a:t>2020-08-12</a:t>
+              <a:t>2020-08-16</a:t>
             </a:fld>
             <a:endParaRPr lang="ko-KR" altLang="en-US" dirty="0"/>
           </a:p>
@@ -2276,7 +2276,7 @@
           <a:p>
             <a:fld id="{BF4D66E5-2E63-4EEE-AEB4-CBC8971B4E82}" type="datetimeFigureOut">
               <a:rPr lang="ko-KR" altLang="en-US" smtClean="0"/>
-              <a:t>2020-08-12</a:t>
+              <a:t>2020-08-16</a:t>
             </a:fld>
             <a:endParaRPr lang="ko-KR" altLang="en-US"/>
           </a:p>
@@ -4387,7 +4387,7 @@
           <a:p>
             <a:fld id="{FC8640AA-852D-4CCA-BFB8-6C6DDFB4B0C6}" type="datetime1">
               <a:rPr lang="ko-KR" altLang="en-US" smtClean="0"/>
-              <a:t>2020-08-12</a:t>
+              <a:t>2020-08-16</a:t>
             </a:fld>
             <a:endParaRPr lang="ko-KR" altLang="en-US" dirty="0"/>
           </a:p>
@@ -6251,7 +6251,7 @@
           <a:p>
             <a:fld id="{FC8640AA-852D-4CCA-BFB8-6C6DDFB4B0C6}" type="datetime1">
               <a:rPr lang="ko-KR" altLang="en-US" smtClean="0"/>
-              <a:t>2020-08-12</a:t>
+              <a:t>2020-08-16</a:t>
             </a:fld>
             <a:endParaRPr lang="ko-KR" altLang="en-US" dirty="0"/>
           </a:p>
@@ -6579,7 +6579,7 @@
         <p:spPr>
           <a:xfrm>
             <a:off x="344488" y="3717032"/>
-            <a:ext cx="8568952" cy="2031325"/>
+            <a:ext cx="8568952" cy="2308324"/>
           </a:xfrm>
           <a:prstGeom prst="rect">
             <a:avLst/>
@@ -6670,11 +6670,26 @@
           <a:p>
             <a:r>
               <a:rPr lang="en-US" altLang="ko-KR" dirty="0" smtClean="0"/>
-              <a:t>	- Logger(</a:t>
-            </a:r>
-            <a:r>
-              <a:rPr lang="ko-KR" altLang="en-US" dirty="0" err="1" smtClean="0"/>
-              <a:t>결정해야함</a:t>
+              <a:t>	- </a:t>
+            </a:r>
+            <a:r>
+              <a:rPr lang="en-US" altLang="ko-KR" smtClean="0"/>
+              <a:t>logback</a:t>
+            </a:r>
+            <a:endParaRPr lang="en-US" altLang="ko-KR" dirty="0" smtClean="0"/>
+          </a:p>
+          <a:p>
+            <a:r>
+              <a:rPr lang="en-US" altLang="ko-KR" dirty="0"/>
+              <a:t>	</a:t>
+            </a:r>
+            <a:r>
+              <a:rPr lang="en-US" altLang="ko-KR" dirty="0" smtClean="0"/>
+              <a:t>- JWT(</a:t>
+            </a:r>
+            <a:r>
+              <a:rPr lang="ko-KR" altLang="en-US" dirty="0" smtClean="0"/>
+              <a:t>인증</a:t>
             </a:r>
             <a:r>
               <a:rPr lang="en-US" altLang="ko-KR" dirty="0" smtClean="0"/>

</xml_diff>

<commit_message>
login form생성 및 http post 성공
</commit_message>
<xml_diff>
--- a/Web_Project_개발가이드.pptx
+++ b/Web_Project_개발가이드.pptx
@@ -120,7 +120,7 @@
   </p:defaultTextStyle>
   <p:extLst>
     <p:ext uri="{EFAFB233-063F-42B5-8137-9DF3F51BA10A}">
-      <p15:sldGuideLst xmlns="" xmlns:p15="http://schemas.microsoft.com/office/powerpoint/2012/main">
+      <p15:sldGuideLst xmlns:p15="http://schemas.microsoft.com/office/powerpoint/2012/main" xmlns="">
         <p15:guide id="1" orient="horz" pos="2160">
           <p15:clr>
             <a:srgbClr val="A4A3A4"/>
@@ -134,7 +134,7 @@
       </p15:sldGuideLst>
     </p:ext>
     <p:ext uri="{2D200454-40CA-4A62-9FC3-DE9A4176ACB9}">
-      <p15:notesGuideLst xmlns="" xmlns:p15="http://schemas.microsoft.com/office/powerpoint/2012/main">
+      <p15:notesGuideLst xmlns:p15="http://schemas.microsoft.com/office/powerpoint/2012/main" xmlns="">
         <p15:guide id="1" orient="horz" pos="2880">
           <p15:clr>
             <a:srgbClr val="A4A3A4"/>
@@ -233,7 +233,7 @@
           <a:p>
             <a:fld id="{11A87D86-70CF-4EFA-807B-0FE5BC66CB49}" type="datetimeFigureOut">
               <a:rPr lang="ko-KR" altLang="en-US" smtClean="0"/>
-              <a:t>2020-08-17</a:t>
+              <a:t>2020-08-22</a:t>
             </a:fld>
             <a:endParaRPr lang="ko-KR" altLang="en-US" dirty="0"/>
           </a:p>
@@ -917,7 +917,7 @@
           <a:p>
             <a:fld id="{FC8640AA-852D-4CCA-BFB8-6C6DDFB4B0C6}" type="datetime1">
               <a:rPr lang="ko-KR" altLang="en-US" smtClean="0"/>
-              <a:t>2020-08-17</a:t>
+              <a:t>2020-08-22</a:t>
             </a:fld>
             <a:endParaRPr lang="ko-KR" altLang="en-US" dirty="0"/>
           </a:p>
@@ -1044,7 +1044,7 @@
             <a:fld id="{D2998125-7EAC-4794-A754-927A8BE1AB53}" type="datetime1">
               <a:rPr lang="ko-KR" altLang="en-US" smtClean="0"/>
               <a:pPr/>
-              <a:t>2020-08-17</a:t>
+              <a:t>2020-08-22</a:t>
             </a:fld>
             <a:endParaRPr lang="ko-KR" altLang="en-US" dirty="0"/>
           </a:p>
@@ -1484,7 +1484,7 @@
             <a:fld id="{D2998125-7EAC-4794-A754-927A8BE1AB53}" type="datetime1">
               <a:rPr lang="ko-KR" altLang="en-US" smtClean="0"/>
               <a:pPr/>
-              <a:t>2020-08-17</a:t>
+              <a:t>2020-08-22</a:t>
             </a:fld>
             <a:endParaRPr lang="ko-KR" altLang="en-US" dirty="0"/>
           </a:p>
@@ -2056,7 +2056,7 @@
           <a:p>
             <a:fld id="{2EA4FFEB-8A33-4D80-BB66-E025D1AC5FE4}" type="datetime1">
               <a:rPr lang="ko-KR" altLang="en-US" smtClean="0"/>
-              <a:t>2020-08-17</a:t>
+              <a:t>2020-08-22</a:t>
             </a:fld>
             <a:endParaRPr lang="ko-KR" altLang="en-US" dirty="0"/>
           </a:p>
@@ -2276,7 +2276,7 @@
           <a:p>
             <a:fld id="{BF4D66E5-2E63-4EEE-AEB4-CBC8971B4E82}" type="datetimeFigureOut">
               <a:rPr lang="ko-KR" altLang="en-US" smtClean="0"/>
-              <a:t>2020-08-17</a:t>
+              <a:t>2020-08-22</a:t>
             </a:fld>
             <a:endParaRPr lang="ko-KR" altLang="en-US"/>
           </a:p>
@@ -4387,7 +4387,7 @@
           <a:p>
             <a:fld id="{FC8640AA-852D-4CCA-BFB8-6C6DDFB4B0C6}" type="datetime1">
               <a:rPr lang="ko-KR" altLang="en-US" smtClean="0"/>
-              <a:t>2020-08-17</a:t>
+              <a:t>2020-08-22</a:t>
             </a:fld>
             <a:endParaRPr lang="ko-KR" altLang="en-US" dirty="0"/>
           </a:p>
@@ -6251,7 +6251,7 @@
           <a:p>
             <a:fld id="{FC8640AA-852D-4CCA-BFB8-6C6DDFB4B0C6}" type="datetime1">
               <a:rPr lang="ko-KR" altLang="en-US" smtClean="0"/>
-              <a:t>2020-08-17</a:t>
+              <a:t>2020-08-22</a:t>
             </a:fld>
             <a:endParaRPr lang="ko-KR" altLang="en-US" dirty="0"/>
           </a:p>
@@ -6673,7 +6673,6 @@
               <a:rPr lang="en-US" altLang="ko-KR" dirty="0" smtClean="0"/>
               <a:t>)</a:t>
             </a:r>
-            <a:endParaRPr lang="en-US" altLang="ko-KR" dirty="0" smtClean="0"/>
           </a:p>
           <a:p>
             <a:r>
@@ -6839,7 +6838,7 @@
         <p:spPr>
           <a:xfrm>
             <a:off x="344488" y="3717032"/>
-            <a:ext cx="8568952" cy="923330"/>
+            <a:ext cx="8568952" cy="1200329"/>
           </a:xfrm>
           <a:prstGeom prst="rect">
             <a:avLst/>
@@ -6884,7 +6883,36 @@
               <a:rPr lang="en-US" altLang="ko-KR" dirty="0" smtClean="0"/>
               <a:t>Redux</a:t>
             </a:r>
-            <a:endParaRPr lang="ko-KR" altLang="en-US" dirty="0"/>
+          </a:p>
+          <a:p>
+            <a:r>
+              <a:rPr lang="en-US" altLang="ko-KR" dirty="0"/>
+              <a:t>	</a:t>
+            </a:r>
+            <a:r>
+              <a:rPr lang="en-US" altLang="ko-KR" dirty="0" smtClean="0"/>
+              <a:t>- Material </a:t>
+            </a:r>
+            <a:r>
+              <a:rPr lang="en-US" altLang="ko-KR" dirty="0" err="1" smtClean="0"/>
+              <a:t>Ui</a:t>
+            </a:r>
+            <a:r>
+              <a:rPr lang="en-US" altLang="ko-KR" dirty="0"/>
+              <a:t> </a:t>
+            </a:r>
+            <a:r>
+              <a:rPr lang="en-US" altLang="ko-KR" dirty="0" smtClean="0"/>
+              <a:t>(</a:t>
+            </a:r>
+            <a:r>
+              <a:rPr lang="en-US" altLang="ko-KR" dirty="0" err="1" smtClean="0"/>
+              <a:t>Ui</a:t>
+            </a:r>
+            <a:r>
+              <a:rPr lang="en-US" altLang="ko-KR" smtClean="0"/>
+              <a:t> template)</a:t>
+            </a:r>
           </a:p>
         </p:txBody>
       </p:sp>

</xml_diff>